<commit_message>
Implementando devolução para ajustes
</commit_message>
<xml_diff>
--- a/Reembolso de despesas.pptx
+++ b/Reembolso de despesas.pptx
@@ -1076,7 +1076,7 @@
         <a:p>
           <a:r>
             <a:rPr lang="pt-BR" dirty="0"/>
-            <a:t>Gestor Centro de Custo</a:t>
+            <a:t>Gestor do Centro de Custo</a:t>
           </a:r>
         </a:p>
       </dgm:t>
@@ -1148,7 +1148,7 @@
         <a:p>
           <a:r>
             <a:rPr lang="pt-BR" dirty="0"/>
-            <a:t>Gestores CNC</a:t>
+            <a:t>Alta Gestão</a:t>
           </a:r>
         </a:p>
       </dgm:t>
@@ -1220,7 +1220,7 @@
         <a:p>
           <a:r>
             <a:rPr lang="pt-BR" dirty="0"/>
-            <a:t>Gerencia financeira</a:t>
+            <a:t>Gerencia Financeira</a:t>
           </a:r>
         </a:p>
       </dgm:t>
@@ -1256,7 +1256,7 @@
         <a:p>
           <a:r>
             <a:rPr lang="pt-BR" dirty="0"/>
-            <a:t>Conferir solicitação</a:t>
+            <a:t>Aferir dados da solicitação</a:t>
           </a:r>
         </a:p>
       </dgm:t>
@@ -1525,8 +1525,8 @@
       </dsp:nvSpPr>
       <dsp:spPr>
         <a:xfrm>
-          <a:off x="4185" y="1341307"/>
-          <a:ext cx="1604428" cy="618639"/>
+          <a:off x="4185" y="1392585"/>
+          <a:ext cx="1604428" cy="584707"/>
         </a:xfrm>
         <a:prstGeom prst="rect">
           <a:avLst/>
@@ -1567,12 +1567,12 @@
         </a:fontRef>
       </dsp:style>
       <dsp:txBody>
-        <a:bodyPr spcFirstLastPara="0" vert="horz" wrap="square" lIns="128016" tIns="73152" rIns="128016" bIns="73152" numCol="1" spcCol="1270" anchor="ctr" anchorCtr="0">
+        <a:bodyPr spcFirstLastPara="0" vert="horz" wrap="square" lIns="120904" tIns="69088" rIns="120904" bIns="69088" numCol="1" spcCol="1270" anchor="ctr" anchorCtr="0">
           <a:noAutofit/>
         </a:bodyPr>
         <a:lstStyle/>
         <a:p>
-          <a:pPr marL="0" lvl="0" indent="0" algn="ctr" defTabSz="800100">
+          <a:pPr marL="0" lvl="0" indent="0" algn="ctr" defTabSz="755650">
             <a:lnSpc>
               <a:spcPct val="90000"/>
             </a:lnSpc>
@@ -1585,14 +1585,14 @@
             <a:buNone/>
           </a:pPr>
           <a:r>
-            <a:rPr lang="pt-BR" sz="1800" kern="1200" dirty="0"/>
+            <a:rPr lang="pt-BR" sz="1700" kern="1200" dirty="0"/>
             <a:t>Solicitante </a:t>
           </a:r>
         </a:p>
       </dsp:txBody>
       <dsp:txXfrm>
-        <a:off x="4185" y="1341307"/>
-        <a:ext cx="1604428" cy="618639"/>
+        <a:off x="4185" y="1392585"/>
+        <a:ext cx="1604428" cy="584707"/>
       </dsp:txXfrm>
     </dsp:sp>
     <dsp:sp modelId="{915C1E27-C158-461E-B395-F8B824098BB1}">
@@ -1602,8 +1602,8 @@
       </dsp:nvSpPr>
       <dsp:spPr>
         <a:xfrm>
-          <a:off x="4185" y="1959946"/>
-          <a:ext cx="1604428" cy="1235250"/>
+          <a:off x="4185" y="1977293"/>
+          <a:ext cx="1604428" cy="1166625"/>
         </a:xfrm>
         <a:prstGeom prst="rect">
           <a:avLst/>
@@ -1646,12 +1646,12 @@
         <a:fontRef idx="minor"/>
       </dsp:style>
       <dsp:txBody>
-        <a:bodyPr spcFirstLastPara="0" vert="horz" wrap="square" lIns="96012" tIns="96012" rIns="128016" bIns="144018" numCol="1" spcCol="1270" anchor="t" anchorCtr="0">
+        <a:bodyPr spcFirstLastPara="0" vert="horz" wrap="square" lIns="90678" tIns="90678" rIns="120904" bIns="136017" numCol="1" spcCol="1270" anchor="t" anchorCtr="0">
           <a:noAutofit/>
         </a:bodyPr>
         <a:lstStyle/>
         <a:p>
-          <a:pPr marL="171450" lvl="1" indent="-171450" algn="l" defTabSz="800100">
+          <a:pPr marL="171450" lvl="1" indent="-171450" algn="l" defTabSz="755650">
             <a:lnSpc>
               <a:spcPct val="90000"/>
             </a:lnSpc>
@@ -1664,12 +1664,12 @@
             <a:buChar char="•"/>
           </a:pPr>
           <a:r>
-            <a:rPr lang="pt-BR" sz="1800" kern="1200" dirty="0"/>
+            <a:rPr lang="pt-BR" sz="1700" kern="1200" dirty="0"/>
             <a:t>Preencher solicitação</a:t>
           </a:r>
         </a:p>
         <a:p>
-          <a:pPr marL="171450" lvl="1" indent="-171450" algn="l" defTabSz="800100">
+          <a:pPr marL="171450" lvl="1" indent="-171450" algn="l" defTabSz="755650">
             <a:lnSpc>
               <a:spcPct val="90000"/>
             </a:lnSpc>
@@ -1682,14 +1682,14 @@
             <a:buChar char="•"/>
           </a:pPr>
           <a:r>
-            <a:rPr lang="pt-BR" sz="1800" kern="1200" dirty="0"/>
+            <a:rPr lang="pt-BR" sz="1700" kern="1200" dirty="0"/>
             <a:t>Anexar comprovante</a:t>
           </a:r>
         </a:p>
       </dsp:txBody>
       <dsp:txXfrm>
-        <a:off x="4185" y="1959946"/>
-        <a:ext cx="1604428" cy="1235250"/>
+        <a:off x="4185" y="1977293"/>
+        <a:ext cx="1604428" cy="1166625"/>
       </dsp:txXfrm>
     </dsp:sp>
     <dsp:sp modelId="{98716004-6432-427D-B1C2-54371D936B46}">
@@ -1699,8 +1699,8 @@
       </dsp:nvSpPr>
       <dsp:spPr>
         <a:xfrm>
-          <a:off x="1833233" y="1341307"/>
-          <a:ext cx="1604428" cy="618639"/>
+          <a:off x="1833233" y="1392585"/>
+          <a:ext cx="1604428" cy="584707"/>
         </a:xfrm>
         <a:prstGeom prst="rect">
           <a:avLst/>
@@ -1741,12 +1741,12 @@
         </a:fontRef>
       </dsp:style>
       <dsp:txBody>
-        <a:bodyPr spcFirstLastPara="0" vert="horz" wrap="square" lIns="128016" tIns="73152" rIns="128016" bIns="73152" numCol="1" spcCol="1270" anchor="ctr" anchorCtr="0">
+        <a:bodyPr spcFirstLastPara="0" vert="horz" wrap="square" lIns="120904" tIns="69088" rIns="120904" bIns="69088" numCol="1" spcCol="1270" anchor="ctr" anchorCtr="0">
           <a:noAutofit/>
         </a:bodyPr>
         <a:lstStyle/>
         <a:p>
-          <a:pPr marL="0" lvl="0" indent="0" algn="ctr" defTabSz="800100">
+          <a:pPr marL="0" lvl="0" indent="0" algn="ctr" defTabSz="755650">
             <a:lnSpc>
               <a:spcPct val="90000"/>
             </a:lnSpc>
@@ -1759,14 +1759,14 @@
             <a:buNone/>
           </a:pPr>
           <a:r>
-            <a:rPr lang="pt-BR" sz="1800" kern="1200" dirty="0"/>
+            <a:rPr lang="pt-BR" sz="1700" kern="1200" dirty="0"/>
             <a:t>Chefia Imediata</a:t>
           </a:r>
         </a:p>
       </dsp:txBody>
       <dsp:txXfrm>
-        <a:off x="1833233" y="1341307"/>
-        <a:ext cx="1604428" cy="618639"/>
+        <a:off x="1833233" y="1392585"/>
+        <a:ext cx="1604428" cy="584707"/>
       </dsp:txXfrm>
     </dsp:sp>
     <dsp:sp modelId="{65B523C8-A378-455C-BF7E-EF3ABA864873}">
@@ -1776,8 +1776,8 @@
       </dsp:nvSpPr>
       <dsp:spPr>
         <a:xfrm>
-          <a:off x="1833233" y="1959946"/>
-          <a:ext cx="1604428" cy="1235250"/>
+          <a:off x="1833233" y="1977293"/>
+          <a:ext cx="1604428" cy="1166625"/>
         </a:xfrm>
         <a:prstGeom prst="rect">
           <a:avLst/>
@@ -1820,12 +1820,12 @@
         <a:fontRef idx="minor"/>
       </dsp:style>
       <dsp:txBody>
-        <a:bodyPr spcFirstLastPara="0" vert="horz" wrap="square" lIns="96012" tIns="96012" rIns="128016" bIns="144018" numCol="1" spcCol="1270" anchor="t" anchorCtr="0">
+        <a:bodyPr spcFirstLastPara="0" vert="horz" wrap="square" lIns="90678" tIns="90678" rIns="120904" bIns="136017" numCol="1" spcCol="1270" anchor="t" anchorCtr="0">
           <a:noAutofit/>
         </a:bodyPr>
         <a:lstStyle/>
         <a:p>
-          <a:pPr marL="171450" lvl="1" indent="-171450" algn="l" defTabSz="800100">
+          <a:pPr marL="171450" lvl="1" indent="-171450" algn="l" defTabSz="755650">
             <a:lnSpc>
               <a:spcPct val="90000"/>
             </a:lnSpc>
@@ -1838,14 +1838,14 @@
             <a:buChar char="•"/>
           </a:pPr>
           <a:r>
-            <a:rPr lang="pt-BR" sz="1800" kern="1200" dirty="0"/>
+            <a:rPr lang="pt-BR" sz="1700" kern="1200" dirty="0"/>
             <a:t>Validar solicitação</a:t>
           </a:r>
         </a:p>
       </dsp:txBody>
       <dsp:txXfrm>
-        <a:off x="1833233" y="1959946"/>
-        <a:ext cx="1604428" cy="1235250"/>
+        <a:off x="1833233" y="1977293"/>
+        <a:ext cx="1604428" cy="1166625"/>
       </dsp:txXfrm>
     </dsp:sp>
     <dsp:sp modelId="{C5A15CEA-636D-4DCC-9791-D708AFCB94D0}">
@@ -1855,8 +1855,8 @@
       </dsp:nvSpPr>
       <dsp:spPr>
         <a:xfrm>
-          <a:off x="3662281" y="1341307"/>
-          <a:ext cx="1604428" cy="618639"/>
+          <a:off x="3662281" y="1392585"/>
+          <a:ext cx="1604428" cy="584707"/>
         </a:xfrm>
         <a:prstGeom prst="rect">
           <a:avLst/>
@@ -1897,12 +1897,12 @@
         </a:fontRef>
       </dsp:style>
       <dsp:txBody>
-        <a:bodyPr spcFirstLastPara="0" vert="horz" wrap="square" lIns="128016" tIns="73152" rIns="128016" bIns="73152" numCol="1" spcCol="1270" anchor="ctr" anchorCtr="0">
+        <a:bodyPr spcFirstLastPara="0" vert="horz" wrap="square" lIns="120904" tIns="69088" rIns="120904" bIns="69088" numCol="1" spcCol="1270" anchor="ctr" anchorCtr="0">
           <a:noAutofit/>
         </a:bodyPr>
         <a:lstStyle/>
         <a:p>
-          <a:pPr marL="0" lvl="0" indent="0" algn="ctr" defTabSz="800100">
+          <a:pPr marL="0" lvl="0" indent="0" algn="ctr" defTabSz="755650">
             <a:lnSpc>
               <a:spcPct val="90000"/>
             </a:lnSpc>
@@ -1915,14 +1915,14 @@
             <a:buNone/>
           </a:pPr>
           <a:r>
-            <a:rPr lang="pt-BR" sz="1800" kern="1200" dirty="0"/>
-            <a:t>Gestor Centro de Custo</a:t>
+            <a:rPr lang="pt-BR" sz="1700" kern="1200" dirty="0"/>
+            <a:t>Gestor do Centro de Custo</a:t>
           </a:r>
         </a:p>
       </dsp:txBody>
       <dsp:txXfrm>
-        <a:off x="3662281" y="1341307"/>
-        <a:ext cx="1604428" cy="618639"/>
+        <a:off x="3662281" y="1392585"/>
+        <a:ext cx="1604428" cy="584707"/>
       </dsp:txXfrm>
     </dsp:sp>
     <dsp:sp modelId="{D2B0B62E-32A3-44A3-904D-75B06CDF8430}">
@@ -1932,8 +1932,8 @@
       </dsp:nvSpPr>
       <dsp:spPr>
         <a:xfrm>
-          <a:off x="3662281" y="1959946"/>
-          <a:ext cx="1604428" cy="1235250"/>
+          <a:off x="3662281" y="1977293"/>
+          <a:ext cx="1604428" cy="1166625"/>
         </a:xfrm>
         <a:prstGeom prst="rect">
           <a:avLst/>
@@ -1976,12 +1976,12 @@
         <a:fontRef idx="minor"/>
       </dsp:style>
       <dsp:txBody>
-        <a:bodyPr spcFirstLastPara="0" vert="horz" wrap="square" lIns="96012" tIns="96012" rIns="128016" bIns="144018" numCol="1" spcCol="1270" anchor="t" anchorCtr="0">
+        <a:bodyPr spcFirstLastPara="0" vert="horz" wrap="square" lIns="90678" tIns="90678" rIns="120904" bIns="136017" numCol="1" spcCol="1270" anchor="t" anchorCtr="0">
           <a:noAutofit/>
         </a:bodyPr>
         <a:lstStyle/>
         <a:p>
-          <a:pPr marL="171450" lvl="1" indent="-171450" algn="l" defTabSz="800100">
+          <a:pPr marL="171450" lvl="1" indent="-171450" algn="l" defTabSz="755650">
             <a:lnSpc>
               <a:spcPct val="90000"/>
             </a:lnSpc>
@@ -1994,14 +1994,14 @@
             <a:buChar char="•"/>
           </a:pPr>
           <a:r>
-            <a:rPr lang="pt-BR" sz="1800" kern="1200" dirty="0"/>
+            <a:rPr lang="pt-BR" sz="1700" kern="1200" dirty="0"/>
             <a:t>Validar solicitação</a:t>
           </a:r>
         </a:p>
       </dsp:txBody>
       <dsp:txXfrm>
-        <a:off x="3662281" y="1959946"/>
-        <a:ext cx="1604428" cy="1235250"/>
+        <a:off x="3662281" y="1977293"/>
+        <a:ext cx="1604428" cy="1166625"/>
       </dsp:txXfrm>
     </dsp:sp>
     <dsp:sp modelId="{D21C7D65-B9AE-441D-AD74-D10BEEF5F51E}">
@@ -2011,8 +2011,8 @@
       </dsp:nvSpPr>
       <dsp:spPr>
         <a:xfrm>
-          <a:off x="5491330" y="1341307"/>
-          <a:ext cx="1604428" cy="618639"/>
+          <a:off x="5491330" y="1392585"/>
+          <a:ext cx="1604428" cy="584707"/>
         </a:xfrm>
         <a:prstGeom prst="rect">
           <a:avLst/>
@@ -2053,12 +2053,12 @@
         </a:fontRef>
       </dsp:style>
       <dsp:txBody>
-        <a:bodyPr spcFirstLastPara="0" vert="horz" wrap="square" lIns="128016" tIns="73152" rIns="128016" bIns="73152" numCol="1" spcCol="1270" anchor="ctr" anchorCtr="0">
+        <a:bodyPr spcFirstLastPara="0" vert="horz" wrap="square" lIns="120904" tIns="69088" rIns="120904" bIns="69088" numCol="1" spcCol="1270" anchor="ctr" anchorCtr="0">
           <a:noAutofit/>
         </a:bodyPr>
         <a:lstStyle/>
         <a:p>
-          <a:pPr marL="0" lvl="0" indent="0" algn="ctr" defTabSz="800100">
+          <a:pPr marL="0" lvl="0" indent="0" algn="ctr" defTabSz="755650">
             <a:lnSpc>
               <a:spcPct val="90000"/>
             </a:lnSpc>
@@ -2071,14 +2071,14 @@
             <a:buNone/>
           </a:pPr>
           <a:r>
-            <a:rPr lang="pt-BR" sz="1800" kern="1200" dirty="0"/>
-            <a:t>Gestores CNC</a:t>
+            <a:rPr lang="pt-BR" sz="1700" kern="1200" dirty="0"/>
+            <a:t>Alta Gestão</a:t>
           </a:r>
         </a:p>
       </dsp:txBody>
       <dsp:txXfrm>
-        <a:off x="5491330" y="1341307"/>
-        <a:ext cx="1604428" cy="618639"/>
+        <a:off x="5491330" y="1392585"/>
+        <a:ext cx="1604428" cy="584707"/>
       </dsp:txXfrm>
     </dsp:sp>
     <dsp:sp modelId="{95DC42A0-9BB9-4165-8926-DF3B9CB2A000}">
@@ -2088,8 +2088,8 @@
       </dsp:nvSpPr>
       <dsp:spPr>
         <a:xfrm>
-          <a:off x="5491330" y="1959946"/>
-          <a:ext cx="1604428" cy="1235250"/>
+          <a:off x="5491330" y="1977293"/>
+          <a:ext cx="1604428" cy="1166625"/>
         </a:xfrm>
         <a:prstGeom prst="rect">
           <a:avLst/>
@@ -2132,12 +2132,12 @@
         <a:fontRef idx="minor"/>
       </dsp:style>
       <dsp:txBody>
-        <a:bodyPr spcFirstLastPara="0" vert="horz" wrap="square" lIns="96012" tIns="96012" rIns="128016" bIns="144018" numCol="1" spcCol="1270" anchor="t" anchorCtr="0">
+        <a:bodyPr spcFirstLastPara="0" vert="horz" wrap="square" lIns="90678" tIns="90678" rIns="120904" bIns="136017" numCol="1" spcCol="1270" anchor="t" anchorCtr="0">
           <a:noAutofit/>
         </a:bodyPr>
         <a:lstStyle/>
         <a:p>
-          <a:pPr marL="171450" lvl="1" indent="-171450" algn="l" defTabSz="800100">
+          <a:pPr marL="171450" lvl="1" indent="-171450" algn="l" defTabSz="755650">
             <a:lnSpc>
               <a:spcPct val="90000"/>
             </a:lnSpc>
@@ -2150,14 +2150,14 @@
             <a:buChar char="•"/>
           </a:pPr>
           <a:r>
-            <a:rPr lang="pt-BR" sz="1800" kern="1200" dirty="0"/>
+            <a:rPr lang="pt-BR" sz="1700" kern="1200" dirty="0"/>
             <a:t>Aprovar solicitação</a:t>
           </a:r>
         </a:p>
       </dsp:txBody>
       <dsp:txXfrm>
-        <a:off x="5491330" y="1959946"/>
-        <a:ext cx="1604428" cy="1235250"/>
+        <a:off x="5491330" y="1977293"/>
+        <a:ext cx="1604428" cy="1166625"/>
       </dsp:txXfrm>
     </dsp:sp>
     <dsp:sp modelId="{3D8D19A7-D7DD-4B63-B717-36B22789C5F2}">
@@ -2167,8 +2167,8 @@
       </dsp:nvSpPr>
       <dsp:spPr>
         <a:xfrm>
-          <a:off x="7320378" y="1341307"/>
-          <a:ext cx="1604428" cy="618639"/>
+          <a:off x="7320378" y="1392585"/>
+          <a:ext cx="1604428" cy="584707"/>
         </a:xfrm>
         <a:prstGeom prst="rect">
           <a:avLst/>
@@ -2209,12 +2209,12 @@
         </a:fontRef>
       </dsp:style>
       <dsp:txBody>
-        <a:bodyPr spcFirstLastPara="0" vert="horz" wrap="square" lIns="128016" tIns="73152" rIns="128016" bIns="73152" numCol="1" spcCol="1270" anchor="ctr" anchorCtr="0">
+        <a:bodyPr spcFirstLastPara="0" vert="horz" wrap="square" lIns="120904" tIns="69088" rIns="120904" bIns="69088" numCol="1" spcCol="1270" anchor="ctr" anchorCtr="0">
           <a:noAutofit/>
         </a:bodyPr>
         <a:lstStyle/>
         <a:p>
-          <a:pPr marL="0" lvl="0" indent="0" algn="ctr" defTabSz="800100">
+          <a:pPr marL="0" lvl="0" indent="0" algn="ctr" defTabSz="755650">
             <a:lnSpc>
               <a:spcPct val="90000"/>
             </a:lnSpc>
@@ -2227,14 +2227,14 @@
             <a:buNone/>
           </a:pPr>
           <a:r>
-            <a:rPr lang="pt-BR" sz="1800" kern="1200" dirty="0"/>
-            <a:t>Gerencia financeira</a:t>
+            <a:rPr lang="pt-BR" sz="1700" kern="1200" dirty="0"/>
+            <a:t>Gerencia Financeira</a:t>
           </a:r>
         </a:p>
       </dsp:txBody>
       <dsp:txXfrm>
-        <a:off x="7320378" y="1341307"/>
-        <a:ext cx="1604428" cy="618639"/>
+        <a:off x="7320378" y="1392585"/>
+        <a:ext cx="1604428" cy="584707"/>
       </dsp:txXfrm>
     </dsp:sp>
     <dsp:sp modelId="{80DA45BE-DAA3-40BA-9286-6B12903D1AA9}">
@@ -2244,8 +2244,8 @@
       </dsp:nvSpPr>
       <dsp:spPr>
         <a:xfrm>
-          <a:off x="7320378" y="1959946"/>
-          <a:ext cx="1604428" cy="1235250"/>
+          <a:off x="7320378" y="1977293"/>
+          <a:ext cx="1604428" cy="1166625"/>
         </a:xfrm>
         <a:prstGeom prst="rect">
           <a:avLst/>
@@ -2288,12 +2288,12 @@
         <a:fontRef idx="minor"/>
       </dsp:style>
       <dsp:txBody>
-        <a:bodyPr spcFirstLastPara="0" vert="horz" wrap="square" lIns="96012" tIns="96012" rIns="128016" bIns="144018" numCol="1" spcCol="1270" anchor="t" anchorCtr="0">
+        <a:bodyPr spcFirstLastPara="0" vert="horz" wrap="square" lIns="90678" tIns="90678" rIns="120904" bIns="136017" numCol="1" spcCol="1270" anchor="t" anchorCtr="0">
           <a:noAutofit/>
         </a:bodyPr>
         <a:lstStyle/>
         <a:p>
-          <a:pPr marL="171450" lvl="1" indent="-171450" algn="l" defTabSz="800100">
+          <a:pPr marL="171450" lvl="1" indent="-171450" algn="l" defTabSz="755650">
             <a:lnSpc>
               <a:spcPct val="90000"/>
             </a:lnSpc>
@@ -2306,14 +2306,14 @@
             <a:buChar char="•"/>
           </a:pPr>
           <a:r>
-            <a:rPr lang="pt-BR" sz="1800" kern="1200" dirty="0"/>
-            <a:t>Conferir solicitação</a:t>
+            <a:rPr lang="pt-BR" sz="1700" kern="1200" dirty="0"/>
+            <a:t>Aferir dados da solicitação</a:t>
           </a:r>
         </a:p>
       </dsp:txBody>
       <dsp:txXfrm>
-        <a:off x="7320378" y="1959946"/>
-        <a:ext cx="1604428" cy="1235250"/>
+        <a:off x="7320378" y="1977293"/>
+        <a:ext cx="1604428" cy="1166625"/>
       </dsp:txXfrm>
     </dsp:sp>
   </dsp:spTree>
@@ -3654,7 +3654,7 @@
             <a:fld id="{6FD22E44-98EB-41F2-A5A3-DC9366D96C52}" type="datetimeFigureOut">
               <a:rPr lang="pt-BR" smtClean="0"/>
               <a:pPr/>
-              <a:t>01/07/2020</a:t>
+              <a:t>14/07/2020</a:t>
             </a:fld>
             <a:endParaRPr lang="pt-BR"/>
           </a:p>
@@ -3820,7 +3820,7 @@
           <a:p>
             <a:fld id="{515D20E7-273D-4BCD-A33C-33C20D53B536}" type="datetimeFigureOut">
               <a:rPr lang="pt-BR" smtClean="0"/>
-              <a:t>01/07/2020</a:t>
+              <a:t>14/07/2020</a:t>
             </a:fld>
             <a:endParaRPr lang="pt-BR"/>
           </a:p>
@@ -7301,7 +7301,7 @@
             <a:fld id="{4E492E1F-AD23-4954-8C0A-1311CECCDDB9}" type="datetimeFigureOut">
               <a:rPr lang="pt-BR" smtClean="0"/>
               <a:pPr/>
-              <a:t>01/07/2020</a:t>
+              <a:t>14/07/2020</a:t>
             </a:fld>
             <a:endParaRPr lang="pt-BR"/>
           </a:p>
@@ -7967,7 +7967,7 @@
           <p:nvPr>
             <p:extLst>
               <p:ext uri="{D42A27DB-BD31-4B8C-83A1-F6EECF244321}">
-                <p14:modId xmlns:p14="http://schemas.microsoft.com/office/powerpoint/2010/main" val="2823251120"/>
+                <p14:modId xmlns:p14="http://schemas.microsoft.com/office/powerpoint/2010/main" val="954703022"/>
               </p:ext>
             </p:extLst>
           </p:nvPr>
@@ -8085,7 +8085,7 @@
             </a:r>
             <a:r>
               <a:rPr lang="pt-BR" sz="3000" dirty="0"/>
-              <a:t> possui somente sete campos, todos com preenchimento obrigatório. São eles: filial, favorecido, centro de custo, data da despesa, valor da despesa com transporte e/ou alimentação. A maioria deles são listas para seleção, apresentando dados em tempo real dos cadastros do sistema TOTVS RM. Nesta etapa o comprovante da despesa deverá ser anexado, obrigatoriamente.</a:t>
+              <a:t> possui sete campos, todos com preenchimento obrigatório. São eles: filial, favorecido, centro de custo, data da despesa, valor da despesa com transporte e/ou alimentação. A maioria deles são listas para seleção, apresentando dados em tempo real dos cadastros do sistema TOTVS RM. Nesta etapa o comprovante da despesa deverá ser anexado, obrigatoriamente.</a:t>
             </a:r>
           </a:p>
         </p:txBody>
@@ -8169,7 +8169,7 @@
         <p:spPr>
           <a:xfrm>
             <a:off x="683568" y="1700808"/>
-            <a:ext cx="7848872" cy="4708981"/>
+            <a:ext cx="7848872" cy="4247317"/>
           </a:xfrm>
           <a:prstGeom prst="rect">
             <a:avLst/>
@@ -8185,14 +8185,14 @@
             <a:pPr algn="just"/>
             <a:r>
               <a:rPr lang="pt-BR" sz="3000" dirty="0"/>
-              <a:t>	O formulário da web disponibilizado possui campos ocultos que possuem autopreenchimento um deles identifica quem é o chefe imediato no cadastro do setor do solicitante. Esta informação é coletada no sistema TOTVS RM no módulo de recursos humanos. </a:t>
+              <a:t>	O formulário possui um recurso que identifica quem é o chefe imediato no cadastro do setor do solicitante. Esta informação é coletada no sistema TOTVS RM no módulo de Recursos Humanos. </a:t>
             </a:r>
           </a:p>
           <a:p>
             <a:pPr algn="just"/>
             <a:r>
               <a:rPr lang="pt-BR" sz="3000" dirty="0"/>
-              <a:t>	Quando Gestor imediato é igual ao Gestor de centro de custo haverá um salto desta etapa. Caso contrário nesta etapa a Chefia imediata irá avançar a solicitação para o Gestor de centro de custo.</a:t>
+              <a:t>	Se o Chefe imediato for igual ao Gestor de centro de custo esta etapa será ignorada. Caso contrário a Chefia imediata poderá rejeitar ou avançar a solicitação para o Gestor de centro de custo.</a:t>
             </a:r>
           </a:p>
           <a:p>
@@ -8260,7 +8260,7 @@
                 </a:solidFill>
                 <a:latin typeface="Helvetica" pitchFamily="34" charset="0"/>
               </a:rPr>
-              <a:t>Gestor CC – Validar solicitação</a:t>
+              <a:t>Gestor do CC – Validar solicitação</a:t>
             </a:r>
           </a:p>
         </p:txBody>
@@ -8296,20 +8296,23 @@
             <a:pPr algn="just"/>
             <a:r>
               <a:rPr lang="pt-BR" sz="3000" dirty="0"/>
-              <a:t>	Esta etapa também possui um campo oculto de autopreenchimento, que é preenchido conforme seleção do centro de custo pelo solicitante. Esta informação é coletada no sistema TOTVS RM no cadastro de centro de custo. </a:t>
+              <a:t>	Esta etapa possui um recurso que identifica o Gestor responsável do centro de custo selecionado na solicitação. Esta informação é coletada no sistema TOTVS RM no cadastro de centro de custo. </a:t>
             </a:r>
           </a:p>
           <a:p>
             <a:pPr algn="just"/>
             <a:r>
               <a:rPr lang="pt-BR" sz="3000" dirty="0"/>
-              <a:t>	Nesta etapa o Gestor do centro de custo irá avançar a solicitação para </a:t>
+              <a:t>	Nesta etapa o </a:t>
             </a:r>
             <a:r>
               <a:rPr lang="pt-BR" sz="3000"/>
-              <a:t>os Gestores da CNC.</a:t>
-            </a:r>
-            <a:endParaRPr lang="pt-BR" sz="3000" dirty="0"/>
+              <a:t>Gestor poderá </a:t>
+            </a:r>
+            <a:r>
+              <a:rPr lang="pt-BR" sz="3000" dirty="0"/>
+              <a:t>rejeitar, solicitar ajuste da solicitação ou avançar a solicitação para Alta Gestão da CNC.</a:t>
+            </a:r>
           </a:p>
         </p:txBody>
       </p:sp>
@@ -8372,7 +8375,7 @@
                 </a:solidFill>
                 <a:latin typeface="Helvetica" pitchFamily="34" charset="0"/>
               </a:rPr>
-              <a:t>Gestores CNC – Aprovar solicitação</a:t>
+              <a:t>Alta Gestão – Aprovar solicitação</a:t>
             </a:r>
           </a:p>
         </p:txBody>
@@ -8392,7 +8395,7 @@
         <p:spPr>
           <a:xfrm>
             <a:off x="683568" y="1700808"/>
-            <a:ext cx="7848872" cy="2862322"/>
+            <a:ext cx="7848872" cy="4247317"/>
           </a:xfrm>
           <a:prstGeom prst="rect">
             <a:avLst/>
@@ -8408,7 +8411,14 @@
             <a:pPr algn="just"/>
             <a:r>
               <a:rPr lang="pt-BR" sz="3000" dirty="0"/>
-              <a:t>	Esta etapa também possui atribuição automática conforme o centro de custo informado, conforme as regras implementadas para Outras Entradas e Autorização de Fornecimento. Assim sendo direcionado para Vice Presidência, Vice Presidência Financeira e Gabinete da Presidência.</a:t>
+              <a:t>	Esta etapa possui atribuição conforme o centro de custo informado, seguindo as mesmas regras implementadas para Outras Entradas e Autorização de Fornecimento. Assim sendo direcionado para Secretaria Geral ou Vice Presidência Financeira ou Gabinete da Presidência.</a:t>
+            </a:r>
+          </a:p>
+          <a:p>
+            <a:pPr algn="just"/>
+            <a:r>
+              <a:rPr lang="pt-BR" sz="3000" dirty="0"/>
+              <a:t>	O Gestor poderá rejeitar, solicitar ajuste da solicitação ou avançar a solicitação para Gerencia Financeira.</a:t>
             </a:r>
           </a:p>
         </p:txBody>
@@ -8461,7 +8471,7 @@
         </p:spPr>
         <p:txBody>
           <a:bodyPr>
-            <a:normAutofit/>
+            <a:normAutofit fontScale="90000"/>
           </a:bodyPr>
           <a:lstStyle/>
           <a:p>
@@ -8472,7 +8482,7 @@
                 </a:solidFill>
                 <a:latin typeface="Helvetica" pitchFamily="34" charset="0"/>
               </a:rPr>
-              <a:t>Gerencia financeira – Conferir solicitação</a:t>
+              <a:t>Gerencia Financeira – Aferir dados da solicitação</a:t>
             </a:r>
           </a:p>
         </p:txBody>
@@ -8492,7 +8502,7 @@
         <p:spPr>
           <a:xfrm>
             <a:off x="683568" y="1700808"/>
-            <a:ext cx="7848872" cy="4247317"/>
+            <a:ext cx="7848872" cy="3323987"/>
           </a:xfrm>
           <a:prstGeom prst="rect">
             <a:avLst/>
@@ -8508,23 +8518,7 @@
             <a:pPr algn="just"/>
             <a:r>
               <a:rPr lang="pt-BR" sz="3000" dirty="0"/>
-              <a:t>	Esta é a ultima etapa do processo onde os dados preenchidos serão validados conforme o comprovante anexado, o responsável poderá aprovar ou rejeitar a solicitação. Em ambos os casos a solicitação é concluída com </a:t>
-            </a:r>
-            <a:r>
-              <a:rPr lang="pt-BR" sz="3000"/>
-              <a:t>este status, </a:t>
-            </a:r>
-            <a:r>
-              <a:rPr lang="pt-BR" sz="3000" dirty="0"/>
-              <a:t>mas </a:t>
-            </a:r>
-            <a:r>
-              <a:rPr lang="pt-BR" sz="3000"/>
-              <a:t>quando aprovado </a:t>
-            </a:r>
-            <a:r>
-              <a:rPr lang="pt-BR" sz="3000" dirty="0"/>
-              <a:t>todos os dados do formulário serão integrados via WebService ao sistema TOTVS RM no  movimento 1.2.35 – Prestação de contas e reembolso PF. </a:t>
+              <a:t>	Nesta etapa do processo os dados preenchidos serão validados conforme o comprovante anexado, o responsável poderá solicitar ajuste da solicitação ou aprovar, quando aprovado todos os dados do formulário serão integrados ao sistema TOTVS RM no  movimento 1.2.35 – Prestação de contas e reembolso PF. </a:t>
             </a:r>
           </a:p>
         </p:txBody>
@@ -9312,13 +9306,12 @@
 </file>
 
 <file path=customXml/item1.xml><?xml version="1.0" encoding="utf-8"?>
-<p:properties xmlns:p="http://schemas.microsoft.com/office/2006/metadata/properties" xmlns:xsi="http://www.w3.org/2001/XMLSchema-instance" xmlns:pc="http://schemas.microsoft.com/office/infopath/2007/PartnerControls">
-  <documentManagement>
-    <Objetivo xmlns="d885478b-f22d-4d19-a775-a8723dc1337f">Apresentação de Power Point com slides personalizados CNC na cor branca.</Objetivo>
-    <Assunto xmlns="45f96d23-d40b-4212-8da3-c017d2a6f7c3">Modelos de documentos - Padrões gráficos</Assunto>
-    <Procedimento xmlns="45f96d23-d40b-4212-8da3-c017d2a6f7c3" xsi:nil="true"/>
-  </documentManagement>
-</p:properties>
+<?mso-contentType ?>
+<FormTemplates xmlns="http://schemas.microsoft.com/sharepoint/v3/contenttype/forms">
+  <Display>DocumentLibraryForm</Display>
+  <Edit>DocumentLibraryForm</Edit>
+  <New>DocumentLibraryForm</New>
+</FormTemplates>
 </file>
 
 <file path=customXml/item2.xml><?xml version="1.0" encoding="utf-8"?>
@@ -9479,27 +9472,19 @@
 </file>
 
 <file path=customXml/item3.xml><?xml version="1.0" encoding="utf-8"?>
-<?mso-contentType ?>
-<FormTemplates xmlns="http://schemas.microsoft.com/sharepoint/v3/contenttype/forms">
-  <Display>DocumentLibraryForm</Display>
-  <Edit>DocumentLibraryForm</Edit>
-  <New>DocumentLibraryForm</New>
-</FormTemplates>
+<p:properties xmlns:p="http://schemas.microsoft.com/office/2006/metadata/properties" xmlns:xsi="http://www.w3.org/2001/XMLSchema-instance" xmlns:pc="http://schemas.microsoft.com/office/infopath/2007/PartnerControls">
+  <documentManagement>
+    <Objetivo xmlns="d885478b-f22d-4d19-a775-a8723dc1337f">Apresentação de Power Point com slides personalizados CNC na cor branca.</Objetivo>
+    <Assunto xmlns="45f96d23-d40b-4212-8da3-c017d2a6f7c3">Modelos de documentos - Padrões gráficos</Assunto>
+    <Procedimento xmlns="45f96d23-d40b-4212-8da3-c017d2a6f7c3" xsi:nil="true"/>
+  </documentManagement>
+</p:properties>
 </file>
 
 <file path=customXml/itemProps1.xml><?xml version="1.0" encoding="utf-8"?>
-<ds:datastoreItem xmlns:ds="http://schemas.openxmlformats.org/officeDocument/2006/customXml" ds:itemID="{ED2DF0E0-0EA2-48B5-9DA2-3321820A21F2}">
+<ds:datastoreItem xmlns:ds="http://schemas.openxmlformats.org/officeDocument/2006/customXml" ds:itemID="{FBD8799C-CBA0-43B6-B31C-584BCF8821B4}">
   <ds:schemaRefs>
-    <ds:schemaRef ds:uri="http://purl.org/dc/dcmitype/"/>
-    <ds:schemaRef ds:uri="http://purl.org/dc/elements/1.1/"/>
-    <ds:schemaRef ds:uri="http://schemas.microsoft.com/office/2006/metadata/properties"/>
-    <ds:schemaRef ds:uri="d885478b-f22d-4d19-a775-a8723dc1337f"/>
-    <ds:schemaRef ds:uri="http://schemas.microsoft.com/office/infopath/2007/PartnerControls"/>
-    <ds:schemaRef ds:uri="http://schemas.microsoft.com/office/2006/documentManagement/types"/>
-    <ds:schemaRef ds:uri="http://purl.org/dc/terms/"/>
-    <ds:schemaRef ds:uri="http://schemas.openxmlformats.org/package/2006/metadata/core-properties"/>
-    <ds:schemaRef ds:uri="45f96d23-d40b-4212-8da3-c017d2a6f7c3"/>
-    <ds:schemaRef ds:uri="http://www.w3.org/XML/1998/namespace"/>
+    <ds:schemaRef ds:uri="http://schemas.microsoft.com/sharepoint/v3/contenttype/forms"/>
   </ds:schemaRefs>
 </ds:datastoreItem>
 </file>
@@ -9524,9 +9509,18 @@
 </file>
 
 <file path=customXml/itemProps3.xml><?xml version="1.0" encoding="utf-8"?>
-<ds:datastoreItem xmlns:ds="http://schemas.openxmlformats.org/officeDocument/2006/customXml" ds:itemID="{FBD8799C-CBA0-43B6-B31C-584BCF8821B4}">
+<ds:datastoreItem xmlns:ds="http://schemas.openxmlformats.org/officeDocument/2006/customXml" ds:itemID="{ED2DF0E0-0EA2-48B5-9DA2-3321820A21F2}">
   <ds:schemaRefs>
-    <ds:schemaRef ds:uri="http://schemas.microsoft.com/sharepoint/v3/contenttype/forms"/>
+    <ds:schemaRef ds:uri="http://purl.org/dc/dcmitype/"/>
+    <ds:schemaRef ds:uri="http://purl.org/dc/elements/1.1/"/>
+    <ds:schemaRef ds:uri="http://schemas.microsoft.com/office/2006/metadata/properties"/>
+    <ds:schemaRef ds:uri="d885478b-f22d-4d19-a775-a8723dc1337f"/>
+    <ds:schemaRef ds:uri="http://schemas.microsoft.com/office/infopath/2007/PartnerControls"/>
+    <ds:schemaRef ds:uri="http://schemas.microsoft.com/office/2006/documentManagement/types"/>
+    <ds:schemaRef ds:uri="http://purl.org/dc/terms/"/>
+    <ds:schemaRef ds:uri="http://schemas.openxmlformats.org/package/2006/metadata/core-properties"/>
+    <ds:schemaRef ds:uri="45f96d23-d40b-4212-8da3-c017d2a6f7c3"/>
+    <ds:schemaRef ds:uri="http://www.w3.org/XML/1998/namespace"/>
   </ds:schemaRefs>
 </ds:datastoreItem>
 </file>
</xml_diff>